<commit_message>
Updated presentation with rendering timing analysis.
Added presentation pdf.
</commit_message>
<xml_diff>
--- a/presentations/final.pptx
+++ b/presentations/final.pptx
@@ -3741,11 +3741,7 @@
             </a:r>
             <a:r>
               <a:rPr lang="en-US" b="1" dirty="0" smtClean="0"/>
-              <a:t> Rendering Pipeline in CUDA for Real-time Indirect </a:t>
-            </a:r>
-            <a:r>
-              <a:rPr lang="en-US" b="1" dirty="0" smtClean="0"/>
-              <a:t>Illumination</a:t>
+              <a:t> Rendering Pipeline in CUDA for Real-time Indirect Illumination</a:t>
             </a:r>
             <a:endParaRPr lang="en-US" dirty="0"/>
           </a:p>
@@ -6663,11 +6659,7 @@
             </a:pPr>
             <a:r>
               <a:rPr lang="en-US" dirty="0" smtClean="0"/>
-              <a:t> </a:t>
-            </a:r>
-            <a:r>
-              <a:rPr lang="en-US" dirty="0" smtClean="0"/>
-              <a:t>SVO Construction is relatively fast, and scales well at ~ log(Res)</a:t>
+              <a:t> SVO Construction is relatively fast, and scales well at ~ log(Res)</a:t>
             </a:r>
           </a:p>
           <a:p>
@@ -6747,59 +6739,898 @@
           </a:p>
         </p:txBody>
       </p:sp>
-      <p:sp>
-        <p:nvSpPr>
-          <p:cNvPr id="3" name="Content Placeholder 2"/>
-          <p:cNvSpPr>
-            <a:spLocks noGrp="1"/>
-          </p:cNvSpPr>
-          <p:nvPr>
-            <p:ph sz="quarter" idx="1"/>
-          </p:nvPr>
+      <p:graphicFrame>
+        <p:nvGraphicFramePr>
+          <p:cNvPr id="4" name="Table 3"/>
+          <p:cNvGraphicFramePr>
+            <a:graphicFrameLocks noGrp="1"/>
+          </p:cNvGraphicFramePr>
+          <p:nvPr/>
+        </p:nvGraphicFramePr>
+        <p:xfrm>
+          <a:off x="304800" y="2286000"/>
+          <a:ext cx="8534400" cy="3337560"/>
+        </p:xfrm>
+        <a:graphic>
+          <a:graphicData uri="http://schemas.openxmlformats.org/drawingml/2006/table">
+            <a:tbl>
+              <a:tblPr firstRow="1" bandRow="1">
+                <a:tableStyleId>{5C22544A-7EE6-4342-B048-85BDC9FD1C3A}</a:tableStyleId>
+              </a:tblPr>
+              <a:tblGrid>
+                <a:gridCol w="1295400"/>
+                <a:gridCol w="1066800"/>
+                <a:gridCol w="1600200"/>
+                <a:gridCol w="1219200"/>
+                <a:gridCol w="1905000"/>
+                <a:gridCol w="1447800"/>
+              </a:tblGrid>
+              <a:tr h="370840">
+                <a:tc>
+                  <a:txBody>
+                    <a:bodyPr/>
+                    <a:lstStyle/>
+                    <a:p>
+                      <a:pPr algn="ctr"/>
+                      <a:r>
+                        <a:rPr lang="en-US" dirty="0" err="1" smtClean="0"/>
+                        <a:t>Voxelized</a:t>
+                      </a:r>
+                      <a:r>
+                        <a:rPr lang="en-US" dirty="0" smtClean="0"/>
+                        <a:t>?</a:t>
+                      </a:r>
+                      <a:endParaRPr lang="en-US" dirty="0"/>
+                    </a:p>
+                  </a:txBody>
+                  <a:tcPr/>
+                </a:tc>
+                <a:tc>
+                  <a:txBody>
+                    <a:bodyPr/>
+                    <a:lstStyle/>
+                    <a:p>
+                      <a:pPr algn="ctr"/>
+                      <a:r>
+                        <a:rPr lang="en-US" dirty="0" smtClean="0"/>
+                        <a:t>Model</a:t>
+                      </a:r>
+                      <a:endParaRPr lang="en-US" dirty="0"/>
+                    </a:p>
+                  </a:txBody>
+                  <a:tcPr/>
+                </a:tc>
+                <a:tc>
+                  <a:txBody>
+                    <a:bodyPr/>
+                    <a:lstStyle/>
+                    <a:p>
+                      <a:pPr algn="ctr"/>
+                      <a:r>
+                        <a:rPr lang="en-US" dirty="0" smtClean="0"/>
+                        <a:t>CUDA Render</a:t>
+                      </a:r>
+                      <a:endParaRPr lang="en-US" dirty="0"/>
+                    </a:p>
+                  </a:txBody>
+                  <a:tcPr/>
+                </a:tc>
+                <a:tc>
+                  <a:txBody>
+                    <a:bodyPr/>
+                    <a:lstStyle/>
+                    <a:p>
+                      <a:pPr algn="ctr"/>
+                      <a:r>
+                        <a:rPr lang="en-US" dirty="0" smtClean="0"/>
+                        <a:t>CUDA</a:t>
+                      </a:r>
+                      <a:r>
+                        <a:rPr lang="en-US" baseline="0" dirty="0" smtClean="0"/>
+                        <a:t> </a:t>
+                      </a:r>
+                      <a:r>
+                        <a:rPr lang="en-US" dirty="0" smtClean="0"/>
+                        <a:t>FPS</a:t>
+                      </a:r>
+                      <a:endParaRPr lang="en-US" dirty="0"/>
+                    </a:p>
+                  </a:txBody>
+                  <a:tcPr/>
+                </a:tc>
+                <a:tc>
+                  <a:txBody>
+                    <a:bodyPr/>
+                    <a:lstStyle/>
+                    <a:p>
+                      <a:pPr algn="ctr"/>
+                      <a:r>
+                        <a:rPr lang="en-US" dirty="0" smtClean="0"/>
+                        <a:t>OpenGL</a:t>
+                      </a:r>
+                      <a:r>
+                        <a:rPr lang="en-US" baseline="0" dirty="0" smtClean="0"/>
+                        <a:t> Render</a:t>
+                      </a:r>
+                      <a:endParaRPr lang="en-US" dirty="0"/>
+                    </a:p>
+                  </a:txBody>
+                  <a:tcPr/>
+                </a:tc>
+                <a:tc>
+                  <a:txBody>
+                    <a:bodyPr/>
+                    <a:lstStyle/>
+                    <a:p>
+                      <a:pPr algn="ctr"/>
+                      <a:r>
+                        <a:rPr lang="en-US" dirty="0" smtClean="0"/>
+                        <a:t>OpenGL FPS</a:t>
+                      </a:r>
+                      <a:endParaRPr lang="en-US" dirty="0"/>
+                    </a:p>
+                  </a:txBody>
+                  <a:tcPr/>
+                </a:tc>
+              </a:tr>
+              <a:tr h="370840">
+                <a:tc rowSpan="4">
+                  <a:txBody>
+                    <a:bodyPr/>
+                    <a:lstStyle/>
+                    <a:p>
+                      <a:pPr algn="ctr"/>
+                      <a:endParaRPr lang="en-US" dirty="0" smtClean="0"/>
+                    </a:p>
+                    <a:p>
+                      <a:pPr algn="ctr"/>
+                      <a:endParaRPr lang="en-US" dirty="0" smtClean="0"/>
+                    </a:p>
+                    <a:p>
+                      <a:pPr algn="ctr"/>
+                      <a:r>
+                        <a:rPr lang="en-US" dirty="0" smtClean="0"/>
+                        <a:t>No</a:t>
+                      </a:r>
+                      <a:endParaRPr lang="en-US" dirty="0"/>
+                    </a:p>
+                  </a:txBody>
+                  <a:tcPr/>
+                </a:tc>
+                <a:tc>
+                  <a:txBody>
+                    <a:bodyPr/>
+                    <a:lstStyle/>
+                    <a:p>
+                      <a:pPr algn="ctr"/>
+                      <a:r>
+                        <a:rPr lang="en-US" dirty="0" smtClean="0"/>
+                        <a:t>Dragon</a:t>
+                      </a:r>
+                      <a:endParaRPr lang="en-US" dirty="0"/>
+                    </a:p>
+                  </a:txBody>
+                  <a:tcPr/>
+                </a:tc>
+                <a:tc>
+                  <a:txBody>
+                    <a:bodyPr/>
+                    <a:lstStyle/>
+                    <a:p>
+                      <a:pPr algn="ctr"/>
+                      <a:r>
+                        <a:rPr lang="en-US" dirty="0" smtClean="0"/>
+                        <a:t>47 ms</a:t>
+                      </a:r>
+                      <a:endParaRPr lang="en-US" dirty="0"/>
+                    </a:p>
+                  </a:txBody>
+                  <a:tcPr/>
+                </a:tc>
+                <a:tc>
+                  <a:txBody>
+                    <a:bodyPr/>
+                    <a:lstStyle/>
+                    <a:p>
+                      <a:pPr algn="ctr"/>
+                      <a:r>
+                        <a:rPr lang="en-US" dirty="0" smtClean="0"/>
+                        <a:t>18</a:t>
+                      </a:r>
+                      <a:endParaRPr lang="en-US" dirty="0"/>
+                    </a:p>
+                  </a:txBody>
+                  <a:tcPr/>
+                </a:tc>
+                <a:tc>
+                  <a:txBody>
+                    <a:bodyPr/>
+                    <a:lstStyle/>
+                    <a:p>
+                      <a:pPr algn="ctr"/>
+                      <a:r>
+                        <a:rPr lang="en-US" dirty="0" smtClean="0"/>
+                        <a:t>15 ms</a:t>
+                      </a:r>
+                      <a:endParaRPr lang="en-US" dirty="0"/>
+                    </a:p>
+                  </a:txBody>
+                  <a:tcPr/>
+                </a:tc>
+                <a:tc>
+                  <a:txBody>
+                    <a:bodyPr/>
+                    <a:lstStyle/>
+                    <a:p>
+                      <a:pPr algn="ctr"/>
+                      <a:r>
+                        <a:rPr lang="en-US" dirty="0" smtClean="0"/>
+                        <a:t>60</a:t>
+                      </a:r>
+                    </a:p>
+                  </a:txBody>
+                  <a:tcPr/>
+                </a:tc>
+              </a:tr>
+              <a:tr h="370840">
+                <a:tc vMerge="1">
+                  <a:txBody>
+                    <a:bodyPr/>
+                    <a:lstStyle/>
+                    <a:p>
+                      <a:endParaRPr lang="en-US"/>
+                    </a:p>
+                  </a:txBody>
+                  <a:tcPr/>
+                </a:tc>
+                <a:tc>
+                  <a:txBody>
+                    <a:bodyPr/>
+                    <a:lstStyle/>
+                    <a:p>
+                      <a:pPr algn="ctr"/>
+                      <a:r>
+                        <a:rPr lang="en-US" dirty="0" smtClean="0"/>
+                        <a:t>Two Cows</a:t>
+                      </a:r>
+                      <a:endParaRPr lang="en-US" dirty="0"/>
+                    </a:p>
+                  </a:txBody>
+                  <a:tcPr/>
+                </a:tc>
+                <a:tc>
+                  <a:txBody>
+                    <a:bodyPr/>
+                    <a:lstStyle/>
+                    <a:p>
+                      <a:pPr algn="ctr"/>
+                      <a:r>
+                        <a:rPr lang="en-US" dirty="0" smtClean="0"/>
+                        <a:t>16 ms</a:t>
+                      </a:r>
+                      <a:endParaRPr lang="en-US" dirty="0"/>
+                    </a:p>
+                  </a:txBody>
+                  <a:tcPr/>
+                </a:tc>
+                <a:tc>
+                  <a:txBody>
+                    <a:bodyPr/>
+                    <a:lstStyle/>
+                    <a:p>
+                      <a:pPr algn="ctr"/>
+                      <a:r>
+                        <a:rPr lang="en-US" dirty="0" smtClean="0"/>
+                        <a:t>35</a:t>
+                      </a:r>
+                      <a:endParaRPr lang="en-US" dirty="0"/>
+                    </a:p>
+                  </a:txBody>
+                  <a:tcPr/>
+                </a:tc>
+                <a:tc>
+                  <a:txBody>
+                    <a:bodyPr/>
+                    <a:lstStyle/>
+                    <a:p>
+                      <a:pPr algn="ctr"/>
+                      <a:r>
+                        <a:rPr lang="en-US" dirty="0" smtClean="0"/>
+                        <a:t>0-5 ms</a:t>
+                      </a:r>
+                      <a:endParaRPr lang="en-US" dirty="0"/>
+                    </a:p>
+                  </a:txBody>
+                  <a:tcPr/>
+                </a:tc>
+                <a:tc>
+                  <a:txBody>
+                    <a:bodyPr/>
+                    <a:lstStyle/>
+                    <a:p>
+                      <a:pPr algn="ctr"/>
+                      <a:r>
+                        <a:rPr lang="en-US" dirty="0" smtClean="0"/>
+                        <a:t>60</a:t>
+                      </a:r>
+                      <a:endParaRPr lang="en-US" dirty="0"/>
+                    </a:p>
+                  </a:txBody>
+                  <a:tcPr/>
+                </a:tc>
+              </a:tr>
+              <a:tr h="370840">
+                <a:tc vMerge="1">
+                  <a:txBody>
+                    <a:bodyPr/>
+                    <a:lstStyle/>
+                    <a:p>
+                      <a:endParaRPr lang="en-US"/>
+                    </a:p>
+                  </a:txBody>
+                  <a:tcPr/>
+                </a:tc>
+                <a:tc>
+                  <a:txBody>
+                    <a:bodyPr/>
+                    <a:lstStyle/>
+                    <a:p>
+                      <a:pPr algn="ctr"/>
+                      <a:r>
+                        <a:rPr lang="en-US" dirty="0" smtClean="0"/>
+                        <a:t>Three*</a:t>
+                      </a:r>
+                      <a:endParaRPr lang="en-US" dirty="0"/>
+                    </a:p>
+                  </a:txBody>
+                  <a:tcPr/>
+                </a:tc>
+                <a:tc>
+                  <a:txBody>
+                    <a:bodyPr/>
+                    <a:lstStyle/>
+                    <a:p>
+                      <a:pPr algn="ctr"/>
+                      <a:r>
+                        <a:rPr lang="en-US" dirty="0" smtClean="0"/>
+                        <a:t>55 ms</a:t>
+                      </a:r>
+                      <a:endParaRPr lang="en-US" dirty="0"/>
+                    </a:p>
+                  </a:txBody>
+                  <a:tcPr/>
+                </a:tc>
+                <a:tc>
+                  <a:txBody>
+                    <a:bodyPr/>
+                    <a:lstStyle/>
+                    <a:p>
+                      <a:pPr algn="ctr"/>
+                      <a:r>
+                        <a:rPr lang="en-US" dirty="0" smtClean="0"/>
+                        <a:t>17</a:t>
+                      </a:r>
+                      <a:endParaRPr lang="en-US" dirty="0"/>
+                    </a:p>
+                  </a:txBody>
+                  <a:tcPr/>
+                </a:tc>
+                <a:tc>
+                  <a:txBody>
+                    <a:bodyPr/>
+                    <a:lstStyle/>
+                    <a:p>
+                      <a:pPr algn="ctr"/>
+                      <a:r>
+                        <a:rPr lang="en-US" dirty="0" smtClean="0"/>
+                        <a:t>15 ms</a:t>
+                      </a:r>
+                      <a:endParaRPr lang="en-US" dirty="0"/>
+                    </a:p>
+                  </a:txBody>
+                  <a:tcPr/>
+                </a:tc>
+                <a:tc>
+                  <a:txBody>
+                    <a:bodyPr/>
+                    <a:lstStyle/>
+                    <a:p>
+                      <a:pPr algn="ctr"/>
+                      <a:r>
+                        <a:rPr lang="en-US" dirty="0" smtClean="0"/>
+                        <a:t>58</a:t>
+                      </a:r>
+                      <a:endParaRPr lang="en-US" dirty="0"/>
+                    </a:p>
+                  </a:txBody>
+                  <a:tcPr/>
+                </a:tc>
+              </a:tr>
+              <a:tr h="370840">
+                <a:tc vMerge="1">
+                  <a:txBody>
+                    <a:bodyPr/>
+                    <a:lstStyle/>
+                    <a:p>
+                      <a:endParaRPr lang="en-US" dirty="0"/>
+                    </a:p>
+                  </a:txBody>
+                  <a:tcPr/>
+                </a:tc>
+                <a:tc>
+                  <a:txBody>
+                    <a:bodyPr/>
+                    <a:lstStyle/>
+                    <a:p>
+                      <a:pPr algn="ctr"/>
+                      <a:r>
+                        <a:rPr lang="en-US" dirty="0" smtClean="0"/>
+                        <a:t>Bunny</a:t>
+                      </a:r>
+                      <a:endParaRPr lang="en-US" dirty="0"/>
+                    </a:p>
+                  </a:txBody>
+                  <a:tcPr/>
+                </a:tc>
+                <a:tc>
+                  <a:txBody>
+                    <a:bodyPr/>
+                    <a:lstStyle/>
+                    <a:p>
+                      <a:pPr algn="ctr"/>
+                      <a:r>
+                        <a:rPr lang="en-US" dirty="0" smtClean="0"/>
+                        <a:t>31 ms</a:t>
+                      </a:r>
+                      <a:endParaRPr lang="en-US" dirty="0"/>
+                    </a:p>
+                  </a:txBody>
+                  <a:tcPr/>
+                </a:tc>
+                <a:tc>
+                  <a:txBody>
+                    <a:bodyPr/>
+                    <a:lstStyle/>
+                    <a:p>
+                      <a:pPr algn="ctr"/>
+                      <a:r>
+                        <a:rPr lang="en-US" dirty="0" smtClean="0"/>
+                        <a:t>29</a:t>
+                      </a:r>
+                      <a:endParaRPr lang="en-US" dirty="0"/>
+                    </a:p>
+                  </a:txBody>
+                  <a:tcPr/>
+                </a:tc>
+                <a:tc>
+                  <a:txBody>
+                    <a:bodyPr/>
+                    <a:lstStyle/>
+                    <a:p>
+                      <a:pPr algn="ctr"/>
+                      <a:r>
+                        <a:rPr lang="en-US" dirty="0" smtClean="0"/>
+                        <a:t>~0 ms</a:t>
+                      </a:r>
+                      <a:endParaRPr lang="en-US" dirty="0"/>
+                    </a:p>
+                  </a:txBody>
+                  <a:tcPr/>
+                </a:tc>
+                <a:tc>
+                  <a:txBody>
+                    <a:bodyPr/>
+                    <a:lstStyle/>
+                    <a:p>
+                      <a:pPr algn="ctr"/>
+                      <a:r>
+                        <a:rPr lang="en-US" dirty="0" smtClean="0"/>
+                        <a:t>60</a:t>
+                      </a:r>
+                      <a:endParaRPr lang="en-US" dirty="0"/>
+                    </a:p>
+                  </a:txBody>
+                  <a:tcPr/>
+                </a:tc>
+              </a:tr>
+              <a:tr h="370840">
+                <a:tc rowSpan="4">
+                  <a:txBody>
+                    <a:bodyPr/>
+                    <a:lstStyle/>
+                    <a:p>
+                      <a:pPr algn="ctr"/>
+                      <a:endParaRPr lang="en-US" dirty="0" smtClean="0"/>
+                    </a:p>
+                    <a:p>
+                      <a:pPr algn="ctr"/>
+                      <a:endParaRPr lang="en-US" dirty="0" smtClean="0"/>
+                    </a:p>
+                    <a:p>
+                      <a:pPr algn="ctr"/>
+                      <a:r>
+                        <a:rPr lang="en-US" dirty="0" smtClean="0"/>
+                        <a:t>Yes</a:t>
+                      </a:r>
+                      <a:endParaRPr lang="en-US" dirty="0"/>
+                    </a:p>
+                  </a:txBody>
+                  <a:tcPr/>
+                </a:tc>
+                <a:tc>
+                  <a:txBody>
+                    <a:bodyPr/>
+                    <a:lstStyle/>
+                    <a:p>
+                      <a:pPr algn="ctr"/>
+                      <a:r>
+                        <a:rPr lang="en-US" dirty="0" smtClean="0"/>
+                        <a:t>Dragon</a:t>
+                      </a:r>
+                      <a:endParaRPr lang="en-US" dirty="0"/>
+                    </a:p>
+                  </a:txBody>
+                  <a:tcPr/>
+                </a:tc>
+                <a:tc>
+                  <a:txBody>
+                    <a:bodyPr/>
+                    <a:lstStyle/>
+                    <a:p>
+                      <a:pPr algn="ctr"/>
+                      <a:r>
+                        <a:rPr lang="en-US" dirty="0" smtClean="0"/>
+                        <a:t>156 ms</a:t>
+                      </a:r>
+                      <a:endParaRPr lang="en-US" dirty="0"/>
+                    </a:p>
+                  </a:txBody>
+                  <a:tcPr/>
+                </a:tc>
+                <a:tc>
+                  <a:txBody>
+                    <a:bodyPr/>
+                    <a:lstStyle/>
+                    <a:p>
+                      <a:pPr algn="ctr"/>
+                      <a:r>
+                        <a:rPr lang="en-US" dirty="0" smtClean="0"/>
+                        <a:t>5</a:t>
+                      </a:r>
+                      <a:endParaRPr lang="en-US" dirty="0"/>
+                    </a:p>
+                  </a:txBody>
+                  <a:tcPr/>
+                </a:tc>
+                <a:tc>
+                  <a:txBody>
+                    <a:bodyPr/>
+                    <a:lstStyle/>
+                    <a:p>
+                      <a:pPr algn="ctr"/>
+                      <a:r>
+                        <a:rPr lang="en-US" dirty="0" smtClean="0"/>
+                        <a:t>31 ms</a:t>
+                      </a:r>
+                      <a:endParaRPr lang="en-US" dirty="0"/>
+                    </a:p>
+                  </a:txBody>
+                  <a:tcPr/>
+                </a:tc>
+                <a:tc>
+                  <a:txBody>
+                    <a:bodyPr/>
+                    <a:lstStyle/>
+                    <a:p>
+                      <a:pPr algn="ctr"/>
+                      <a:r>
+                        <a:rPr lang="en-US" dirty="0" smtClean="0"/>
+                        <a:t>30</a:t>
+                      </a:r>
+                      <a:endParaRPr lang="en-US" dirty="0"/>
+                    </a:p>
+                  </a:txBody>
+                  <a:tcPr/>
+                </a:tc>
+              </a:tr>
+              <a:tr h="370840">
+                <a:tc vMerge="1">
+                  <a:txBody>
+                    <a:bodyPr/>
+                    <a:lstStyle/>
+                    <a:p>
+                      <a:endParaRPr lang="en-US"/>
+                    </a:p>
+                  </a:txBody>
+                  <a:tcPr/>
+                </a:tc>
+                <a:tc>
+                  <a:txBody>
+                    <a:bodyPr/>
+                    <a:lstStyle/>
+                    <a:p>
+                      <a:pPr algn="ctr"/>
+                      <a:r>
+                        <a:rPr lang="en-US" dirty="0" smtClean="0"/>
+                        <a:t>Two Cows</a:t>
+                      </a:r>
+                      <a:endParaRPr lang="en-US" dirty="0"/>
+                    </a:p>
+                  </a:txBody>
+                  <a:tcPr/>
+                </a:tc>
+                <a:tc>
+                  <a:txBody>
+                    <a:bodyPr/>
+                    <a:lstStyle/>
+                    <a:p>
+                      <a:pPr algn="ctr"/>
+                      <a:r>
+                        <a:rPr lang="en-US" dirty="0" smtClean="0"/>
+                        <a:t>23 ms</a:t>
+                      </a:r>
+                      <a:endParaRPr lang="en-US" dirty="0"/>
+                    </a:p>
+                  </a:txBody>
+                  <a:tcPr/>
+                </a:tc>
+                <a:tc>
+                  <a:txBody>
+                    <a:bodyPr/>
+                    <a:lstStyle/>
+                    <a:p>
+                      <a:pPr algn="ctr"/>
+                      <a:r>
+                        <a:rPr lang="en-US" dirty="0" smtClean="0"/>
+                        <a:t>27</a:t>
+                      </a:r>
+                      <a:endParaRPr lang="en-US" dirty="0"/>
+                    </a:p>
+                  </a:txBody>
+                  <a:tcPr/>
+                </a:tc>
+                <a:tc>
+                  <a:txBody>
+                    <a:bodyPr/>
+                    <a:lstStyle/>
+                    <a:p>
+                      <a:pPr algn="ctr"/>
+                      <a:r>
+                        <a:rPr lang="en-US" dirty="0" smtClean="0"/>
+                        <a:t>15 ms</a:t>
+                      </a:r>
+                      <a:endParaRPr lang="en-US" dirty="0"/>
+                    </a:p>
+                  </a:txBody>
+                  <a:tcPr/>
+                </a:tc>
+                <a:tc>
+                  <a:txBody>
+                    <a:bodyPr/>
+                    <a:lstStyle/>
+                    <a:p>
+                      <a:pPr algn="ctr"/>
+                      <a:r>
+                        <a:rPr lang="en-US" dirty="0" smtClean="0"/>
+                        <a:t>60</a:t>
+                      </a:r>
+                      <a:endParaRPr lang="en-US" dirty="0"/>
+                    </a:p>
+                  </a:txBody>
+                  <a:tcPr/>
+                </a:tc>
+              </a:tr>
+              <a:tr h="370840">
+                <a:tc vMerge="1">
+                  <a:txBody>
+                    <a:bodyPr/>
+                    <a:lstStyle/>
+                    <a:p>
+                      <a:endParaRPr lang="en-US"/>
+                    </a:p>
+                  </a:txBody>
+                  <a:tcPr/>
+                </a:tc>
+                <a:tc>
+                  <a:txBody>
+                    <a:bodyPr/>
+                    <a:lstStyle/>
+                    <a:p>
+                      <a:pPr algn="ctr"/>
+                      <a:r>
+                        <a:rPr lang="en-US" dirty="0" smtClean="0"/>
+                        <a:t>Three*</a:t>
+                      </a:r>
+                      <a:endParaRPr lang="en-US" dirty="0"/>
+                    </a:p>
+                  </a:txBody>
+                  <a:tcPr/>
+                </a:tc>
+                <a:tc>
+                  <a:txBody>
+                    <a:bodyPr/>
+                    <a:lstStyle/>
+                    <a:p>
+                      <a:pPr algn="ctr"/>
+                      <a:r>
+                        <a:rPr lang="en-US" dirty="0" smtClean="0"/>
+                        <a:t>141 ms</a:t>
+                      </a:r>
+                      <a:endParaRPr lang="en-US" dirty="0"/>
+                    </a:p>
+                  </a:txBody>
+                  <a:tcPr/>
+                </a:tc>
+                <a:tc>
+                  <a:txBody>
+                    <a:bodyPr/>
+                    <a:lstStyle/>
+                    <a:p>
+                      <a:pPr algn="ctr"/>
+                      <a:r>
+                        <a:rPr lang="en-US" dirty="0" smtClean="0"/>
+                        <a:t>7</a:t>
+                      </a:r>
+                      <a:endParaRPr lang="en-US" dirty="0"/>
+                    </a:p>
+                  </a:txBody>
+                  <a:tcPr/>
+                </a:tc>
+                <a:tc>
+                  <a:txBody>
+                    <a:bodyPr/>
+                    <a:lstStyle/>
+                    <a:p>
+                      <a:pPr algn="ctr"/>
+                      <a:r>
+                        <a:rPr lang="en-US" dirty="0" smtClean="0"/>
+                        <a:t>16 ms</a:t>
+                      </a:r>
+                      <a:endParaRPr lang="en-US" dirty="0"/>
+                    </a:p>
+                  </a:txBody>
+                  <a:tcPr/>
+                </a:tc>
+                <a:tc>
+                  <a:txBody>
+                    <a:bodyPr/>
+                    <a:lstStyle/>
+                    <a:p>
+                      <a:pPr algn="ctr"/>
+                      <a:r>
+                        <a:rPr lang="en-US" dirty="0" smtClean="0"/>
+                        <a:t>34</a:t>
+                      </a:r>
+                      <a:endParaRPr lang="en-US" dirty="0"/>
+                    </a:p>
+                  </a:txBody>
+                  <a:tcPr/>
+                </a:tc>
+              </a:tr>
+              <a:tr h="370840">
+                <a:tc vMerge="1">
+                  <a:txBody>
+                    <a:bodyPr/>
+                    <a:lstStyle/>
+                    <a:p>
+                      <a:endParaRPr lang="en-US" dirty="0"/>
+                    </a:p>
+                  </a:txBody>
+                  <a:tcPr/>
+                </a:tc>
+                <a:tc>
+                  <a:txBody>
+                    <a:bodyPr/>
+                    <a:lstStyle/>
+                    <a:p>
+                      <a:pPr algn="ctr"/>
+                      <a:r>
+                        <a:rPr lang="en-US" dirty="0" smtClean="0"/>
+                        <a:t>Bunny</a:t>
+                      </a:r>
+                      <a:endParaRPr lang="en-US" dirty="0"/>
+                    </a:p>
+                  </a:txBody>
+                  <a:tcPr/>
+                </a:tc>
+                <a:tc>
+                  <a:txBody>
+                    <a:bodyPr/>
+                    <a:lstStyle/>
+                    <a:p>
+                      <a:pPr algn="ctr"/>
+                      <a:r>
+                        <a:rPr lang="en-US" dirty="0" smtClean="0"/>
+                        <a:t>109 ms</a:t>
+                      </a:r>
+                      <a:endParaRPr lang="en-US" dirty="0"/>
+                    </a:p>
+                  </a:txBody>
+                  <a:tcPr/>
+                </a:tc>
+                <a:tc>
+                  <a:txBody>
+                    <a:bodyPr/>
+                    <a:lstStyle/>
+                    <a:p>
+                      <a:pPr algn="ctr"/>
+                      <a:r>
+                        <a:rPr lang="en-US" dirty="0" smtClean="0"/>
+                        <a:t>10</a:t>
+                      </a:r>
+                      <a:endParaRPr lang="en-US" dirty="0"/>
+                    </a:p>
+                  </a:txBody>
+                  <a:tcPr/>
+                </a:tc>
+                <a:tc>
+                  <a:txBody>
+                    <a:bodyPr/>
+                    <a:lstStyle/>
+                    <a:p>
+                      <a:pPr algn="ctr"/>
+                      <a:r>
+                        <a:rPr lang="en-US" dirty="0" smtClean="0"/>
+                        <a:t>15 ms</a:t>
+                      </a:r>
+                      <a:endParaRPr lang="en-US" dirty="0"/>
+                    </a:p>
+                  </a:txBody>
+                  <a:tcPr/>
+                </a:tc>
+                <a:tc>
+                  <a:txBody>
+                    <a:bodyPr/>
+                    <a:lstStyle/>
+                    <a:p>
+                      <a:pPr algn="ctr"/>
+                      <a:r>
+                        <a:rPr lang="en-US" dirty="0" smtClean="0"/>
+                        <a:t>47</a:t>
+                      </a:r>
+                      <a:endParaRPr lang="en-US" dirty="0"/>
+                    </a:p>
+                  </a:txBody>
+                  <a:tcPr/>
+                </a:tc>
+              </a:tr>
+            </a:tbl>
+          </a:graphicData>
+        </a:graphic>
+      </p:graphicFrame>
+      <p:sp>
+        <p:nvSpPr>
+          <p:cNvPr id="5" name="TextBox 4"/>
+          <p:cNvSpPr txBox="1"/>
+          <p:nvPr/>
         </p:nvSpPr>
         <p:spPr>
           <a:xfrm>
-            <a:off x="838200" y="1600200"/>
-            <a:ext cx="7772400" cy="4572000"/>
+            <a:off x="4724400" y="5943600"/>
+            <a:ext cx="3352800" cy="646331"/>
           </a:xfrm>
+          <a:prstGeom prst="rect">
+            <a:avLst/>
+          </a:prstGeom>
+          <a:noFill/>
         </p:spPr>
         <p:txBody>
-          <a:bodyPr/>
+          <a:bodyPr wrap="square" rtlCol="0">
+            <a:spAutoFit/>
+          </a:bodyPr>
           <a:lstStyle/>
           <a:p>
             <a:r>
               <a:rPr lang="en-US" dirty="0" smtClean="0"/>
-              <a:t>(Compare </a:t>
+              <a:t>*Three is a model scene contains dragon, bunny and </a:t>
             </a:r>
             <a:r>
               <a:rPr lang="en-US" dirty="0" err="1" smtClean="0"/>
-              <a:t>framerate</a:t>
+              <a:t>buddha</a:t>
             </a:r>
             <a:r>
               <a:rPr lang="en-US" dirty="0" smtClean="0"/>
-              <a:t> of tri-mesh rendering between CUDA and OpenGL pipelines.)</a:t>
-            </a:r>
-          </a:p>
-          <a:p>
-            <a:r>
-              <a:rPr lang="en-US" dirty="0" smtClean="0"/>
-              <a:t>(Compare </a:t>
-            </a:r>
-            <a:r>
-              <a:rPr lang="en-US" dirty="0" err="1" smtClean="0"/>
-              <a:t>framerate</a:t>
-            </a:r>
-            <a:r>
-              <a:rPr lang="en-US" dirty="0" smtClean="0"/>
-              <a:t> of </a:t>
-            </a:r>
-            <a:r>
-              <a:rPr lang="en-US" dirty="0" err="1" smtClean="0"/>
-              <a:t>voxelized</a:t>
-            </a:r>
-            <a:r>
-              <a:rPr lang="en-US" dirty="0" smtClean="0"/>
-              <a:t> rendering at different resolutions.)</a:t>
+              <a:t> objects.</a:t>
             </a:r>
             <a:endParaRPr lang="en-US" dirty="0"/>
           </a:p>
@@ -7042,11 +7873,7 @@
             </a:pPr>
             <a:r>
               <a:rPr lang="en-US" dirty="0" smtClean="0"/>
-              <a:t>“Interactive </a:t>
-            </a:r>
-            <a:r>
-              <a:rPr lang="en-US" dirty="0" smtClean="0"/>
-              <a:t>Indirect Illumination Using </a:t>
+              <a:t>“Interactive Indirect Illumination Using </a:t>
             </a:r>
             <a:r>
               <a:rPr lang="en-US" dirty="0" err="1" smtClean="0"/>
@@ -7054,11 +7881,7 @@
             </a:r>
             <a:r>
               <a:rPr lang="en-US" dirty="0" smtClean="0"/>
-              <a:t> Cone </a:t>
-            </a:r>
-            <a:r>
-              <a:rPr lang="en-US" dirty="0" smtClean="0"/>
-              <a:t>Tracing” – Cyril </a:t>
+              <a:t> Cone Tracing” – Cyril </a:t>
             </a:r>
             <a:r>
               <a:rPr lang="en-US" dirty="0" err="1" smtClean="0"/>
@@ -7080,11 +7903,7 @@
             </a:r>
             <a:r>
               <a:rPr lang="en-US" dirty="0" smtClean="0"/>
-              <a:t>-Based </a:t>
-            </a:r>
-            <a:r>
-              <a:rPr lang="en-US" dirty="0" smtClean="0"/>
-              <a:t>Sparse </a:t>
+              <a:t>-Based Sparse </a:t>
             </a:r>
             <a:r>
               <a:rPr lang="en-US" dirty="0" err="1" smtClean="0"/>
@@ -7110,7 +7929,6 @@
               <a:rPr lang="en-US" dirty="0" smtClean="0"/>
               <a:t>. OpenGL Insights, Chapter 22.</a:t>
             </a:r>
-            <a:endParaRPr lang="en-US" dirty="0" smtClean="0"/>
           </a:p>
           <a:p>
             <a:pPr>
@@ -7174,7 +7992,6 @@
               <a:rPr lang="en-US" dirty="0" smtClean="0"/>
               <a:t>, NVIDIA Research</a:t>
             </a:r>
-            <a:endParaRPr lang="en-US" dirty="0" smtClean="0"/>
           </a:p>
         </p:txBody>
       </p:sp>

</xml_diff>